<commit_message>
update 2023 up to tp7
</commit_message>
<xml_diff>
--- a/Figures/Figures.pptx
+++ b/Figures/Figures.pptx
@@ -8,6 +8,7 @@
     <p:sldId id="259" r:id="rId2"/>
     <p:sldId id="257" r:id="rId3"/>
     <p:sldId id="258" r:id="rId4"/>
+    <p:sldId id="260" r:id="rId5"/>
   </p:sldIdLst>
   <p:sldSz cx="12192000" cy="6858000"/>
   <p:notesSz cx="6858000" cy="9144000"/>
@@ -118,55 +119,338 @@
 <pc:chgInfo xmlns:a="http://schemas.openxmlformats.org/drawingml/2006/main" xmlns:r="http://schemas.openxmlformats.org/officeDocument/2006/relationships" xmlns:ac="http://schemas.microsoft.com/office/drawing/2013/main/command" xmlns:pc="http://schemas.microsoft.com/office/powerpoint/2013/main/command">
   <pc:docChgLst>
     <pc:chgData name="Dufour Simon" userId="38428de1-9cbc-422b-8b16-f4b0dc7c0437" providerId="ADAL" clId="{E8C959ED-9010-4EDC-901A-C1A4A80C5EEA}"/>
-    <pc:docChg chg="custSel modSld">
-      <pc:chgData name="Dufour Simon" userId="38428de1-9cbc-422b-8b16-f4b0dc7c0437" providerId="ADAL" clId="{E8C959ED-9010-4EDC-901A-C1A4A80C5EEA}" dt="2021-05-07T14:05:09.589" v="13" actId="164"/>
+  </pc:docChgLst>
+  <pc:docChgLst>
+    <pc:chgData name="Simon Dufour" userId="38428de1-9cbc-422b-8b16-f4b0dc7c0437" providerId="ADAL" clId="{57236147-EF1D-4DE3-8D39-A4D9196631B0}"/>
+    <pc:docChg chg="undo custSel addSld modSld">
+      <pc:chgData name="Simon Dufour" userId="38428de1-9cbc-422b-8b16-f4b0dc7c0437" providerId="ADAL" clId="{57236147-EF1D-4DE3-8D39-A4D9196631B0}" dt="2023-01-12T13:31:07.413" v="641" actId="164"/>
       <pc:docMkLst>
         <pc:docMk/>
       </pc:docMkLst>
-      <pc:sldChg chg="addSp delSp modSp">
-        <pc:chgData name="Dufour Simon" userId="38428de1-9cbc-422b-8b16-f4b0dc7c0437" providerId="ADAL" clId="{E8C959ED-9010-4EDC-901A-C1A4A80C5EEA}" dt="2021-05-07T14:05:09.589" v="13" actId="164"/>
+      <pc:sldChg chg="addSp delSp modSp add">
+        <pc:chgData name="Simon Dufour" userId="38428de1-9cbc-422b-8b16-f4b0dc7c0437" providerId="ADAL" clId="{57236147-EF1D-4DE3-8D39-A4D9196631B0}" dt="2023-01-12T13:31:07.413" v="641" actId="164"/>
         <pc:sldMkLst>
           <pc:docMk/>
-          <pc:sldMk cId="10022089" sldId="258"/>
+          <pc:sldMk cId="3446356298" sldId="260"/>
         </pc:sldMkLst>
-        <pc:spChg chg="add del mod">
-          <ac:chgData name="Dufour Simon" userId="38428de1-9cbc-422b-8b16-f4b0dc7c0437" providerId="ADAL" clId="{E8C959ED-9010-4EDC-901A-C1A4A80C5EEA}" dt="2021-05-07T14:04:32.092" v="8" actId="478"/>
+        <pc:spChg chg="del">
+          <ac:chgData name="Simon Dufour" userId="38428de1-9cbc-422b-8b16-f4b0dc7c0437" providerId="ADAL" clId="{57236147-EF1D-4DE3-8D39-A4D9196631B0}" dt="2023-01-12T13:08:57.248" v="2" actId="478"/>
           <ac:spMkLst>
             <pc:docMk/>
-            <pc:sldMk cId="10022089" sldId="258"/>
-            <ac:spMk id="5" creationId="{7994D48D-9BD2-41FC-918D-A4C5C0E8B966}"/>
+            <pc:sldMk cId="3446356298" sldId="260"/>
+            <ac:spMk id="2" creationId="{561FB85B-FDEB-4B69-B506-B998B200AB6A}"/>
+          </ac:spMkLst>
+        </pc:spChg>
+        <pc:spChg chg="del">
+          <ac:chgData name="Simon Dufour" userId="38428de1-9cbc-422b-8b16-f4b0dc7c0437" providerId="ADAL" clId="{57236147-EF1D-4DE3-8D39-A4D9196631B0}" dt="2023-01-12T13:08:56.151" v="1" actId="478"/>
+          <ac:spMkLst>
+            <pc:docMk/>
+            <pc:sldMk cId="3446356298" sldId="260"/>
+            <ac:spMk id="3" creationId="{3750E8C7-BF5D-4F77-82F3-102E96AE8CDF}"/>
+          </ac:spMkLst>
+        </pc:spChg>
+        <pc:spChg chg="add mod">
+          <ac:chgData name="Simon Dufour" userId="38428de1-9cbc-422b-8b16-f4b0dc7c0437" providerId="ADAL" clId="{57236147-EF1D-4DE3-8D39-A4D9196631B0}" dt="2023-01-12T13:31:07.413" v="641" actId="164"/>
+          <ac:spMkLst>
+            <pc:docMk/>
+            <pc:sldMk cId="3446356298" sldId="260"/>
+            <ac:spMk id="4" creationId="{55077265-B3C7-450C-9B16-552B487BA725}"/>
+          </ac:spMkLst>
+        </pc:spChg>
+        <pc:spChg chg="add del mod">
+          <ac:chgData name="Simon Dufour" userId="38428de1-9cbc-422b-8b16-f4b0dc7c0437" providerId="ADAL" clId="{57236147-EF1D-4DE3-8D39-A4D9196631B0}" dt="2023-01-12T13:09:46.664" v="40" actId="478"/>
+          <ac:spMkLst>
+            <pc:docMk/>
+            <pc:sldMk cId="3446356298" sldId="260"/>
+            <ac:spMk id="5" creationId="{F101F99D-10E8-4C91-B95C-D3841E61B214}"/>
+          </ac:spMkLst>
+        </pc:spChg>
+        <pc:spChg chg="add mod">
+          <ac:chgData name="Simon Dufour" userId="38428de1-9cbc-422b-8b16-f4b0dc7c0437" providerId="ADAL" clId="{57236147-EF1D-4DE3-8D39-A4D9196631B0}" dt="2023-01-12T13:31:07.413" v="641" actId="164"/>
+          <ac:spMkLst>
+            <pc:docMk/>
+            <pc:sldMk cId="3446356298" sldId="260"/>
+            <ac:spMk id="6" creationId="{D7A54963-62AD-4DA9-8E6A-97BBEDE64C4D}"/>
+          </ac:spMkLst>
+        </pc:spChg>
+        <pc:spChg chg="add del mod">
+          <ac:chgData name="Simon Dufour" userId="38428de1-9cbc-422b-8b16-f4b0dc7c0437" providerId="ADAL" clId="{57236147-EF1D-4DE3-8D39-A4D9196631B0}" dt="2023-01-12T13:12:52.355" v="116" actId="478"/>
+          <ac:spMkLst>
+            <pc:docMk/>
+            <pc:sldMk cId="3446356298" sldId="260"/>
+            <ac:spMk id="7" creationId="{C5527063-2A50-4668-AC05-8E3557959B0A}"/>
+          </ac:spMkLst>
+        </pc:spChg>
+        <pc:spChg chg="add mod">
+          <ac:chgData name="Simon Dufour" userId="38428de1-9cbc-422b-8b16-f4b0dc7c0437" providerId="ADAL" clId="{57236147-EF1D-4DE3-8D39-A4D9196631B0}" dt="2023-01-12T13:31:07.413" v="641" actId="164"/>
+          <ac:spMkLst>
+            <pc:docMk/>
+            <pc:sldMk cId="3446356298" sldId="260"/>
+            <ac:spMk id="8" creationId="{9C5FDDA2-6D2A-4A55-8F0F-03763693F306}"/>
+          </ac:spMkLst>
+        </pc:spChg>
+        <pc:spChg chg="add del mod">
+          <ac:chgData name="Simon Dufour" userId="38428de1-9cbc-422b-8b16-f4b0dc7c0437" providerId="ADAL" clId="{57236147-EF1D-4DE3-8D39-A4D9196631B0}" dt="2023-01-12T13:15:31.996" v="167" actId="478"/>
+          <ac:spMkLst>
+            <pc:docMk/>
+            <pc:sldMk cId="3446356298" sldId="260"/>
+            <ac:spMk id="11" creationId="{49D20B95-F438-4267-BC6A-670DAF213190}"/>
+          </ac:spMkLst>
+        </pc:spChg>
+        <pc:spChg chg="add mod">
+          <ac:chgData name="Simon Dufour" userId="38428de1-9cbc-422b-8b16-f4b0dc7c0437" providerId="ADAL" clId="{57236147-EF1D-4DE3-8D39-A4D9196631B0}" dt="2023-01-12T13:31:07.413" v="641" actId="164"/>
+          <ac:spMkLst>
+            <pc:docMk/>
+            <pc:sldMk cId="3446356298" sldId="260"/>
+            <ac:spMk id="16" creationId="{51D5F132-1C2B-47E5-9EBA-A5B5B37CC996}"/>
+          </ac:spMkLst>
+        </pc:spChg>
+        <pc:spChg chg="add mod">
+          <ac:chgData name="Simon Dufour" userId="38428de1-9cbc-422b-8b16-f4b0dc7c0437" providerId="ADAL" clId="{57236147-EF1D-4DE3-8D39-A4D9196631B0}" dt="2023-01-12T13:31:07.413" v="641" actId="164"/>
+          <ac:spMkLst>
+            <pc:docMk/>
+            <pc:sldMk cId="3446356298" sldId="260"/>
+            <ac:spMk id="17" creationId="{5E4F38DF-5B1F-4478-9498-60D951B46CF5}"/>
+          </ac:spMkLst>
+        </pc:spChg>
+        <pc:spChg chg="add mod">
+          <ac:chgData name="Simon Dufour" userId="38428de1-9cbc-422b-8b16-f4b0dc7c0437" providerId="ADAL" clId="{57236147-EF1D-4DE3-8D39-A4D9196631B0}" dt="2023-01-12T13:31:07.413" v="641" actId="164"/>
+          <ac:spMkLst>
+            <pc:docMk/>
+            <pc:sldMk cId="3446356298" sldId="260"/>
+            <ac:spMk id="18" creationId="{69495860-F8D9-4C84-9855-1C3C8365BE7C}"/>
+          </ac:spMkLst>
+        </pc:spChg>
+        <pc:spChg chg="add mod">
+          <ac:chgData name="Simon Dufour" userId="38428de1-9cbc-422b-8b16-f4b0dc7c0437" providerId="ADAL" clId="{57236147-EF1D-4DE3-8D39-A4D9196631B0}" dt="2023-01-12T13:31:07.413" v="641" actId="164"/>
+          <ac:spMkLst>
+            <pc:docMk/>
+            <pc:sldMk cId="3446356298" sldId="260"/>
+            <ac:spMk id="21" creationId="{F33A9EE8-A056-4880-BE3D-14F269452A79}"/>
+          </ac:spMkLst>
+        </pc:spChg>
+        <pc:spChg chg="add del mod">
+          <ac:chgData name="Simon Dufour" userId="38428de1-9cbc-422b-8b16-f4b0dc7c0437" providerId="ADAL" clId="{57236147-EF1D-4DE3-8D39-A4D9196631B0}" dt="2023-01-12T13:17:49.229" v="273" actId="478"/>
+          <ac:spMkLst>
+            <pc:docMk/>
+            <pc:sldMk cId="3446356298" sldId="260"/>
+            <ac:spMk id="22" creationId="{97230AC0-BF11-4C27-A061-0A216A917B02}"/>
+          </ac:spMkLst>
+        </pc:spChg>
+        <pc:spChg chg="add mod">
+          <ac:chgData name="Simon Dufour" userId="38428de1-9cbc-422b-8b16-f4b0dc7c0437" providerId="ADAL" clId="{57236147-EF1D-4DE3-8D39-A4D9196631B0}" dt="2023-01-12T13:31:07.413" v="641" actId="164"/>
+          <ac:spMkLst>
+            <pc:docMk/>
+            <pc:sldMk cId="3446356298" sldId="260"/>
+            <ac:spMk id="28" creationId="{F3823DAD-A1F6-4E37-BF8D-C6B38AF687F4}"/>
+          </ac:spMkLst>
+        </pc:spChg>
+        <pc:spChg chg="add mod">
+          <ac:chgData name="Simon Dufour" userId="38428de1-9cbc-422b-8b16-f4b0dc7c0437" providerId="ADAL" clId="{57236147-EF1D-4DE3-8D39-A4D9196631B0}" dt="2023-01-12T13:31:07.413" v="641" actId="164"/>
+          <ac:spMkLst>
+            <pc:docMk/>
+            <pc:sldMk cId="3446356298" sldId="260"/>
+            <ac:spMk id="32" creationId="{DDBFBF51-64A5-4114-9676-C68B922B4858}"/>
+          </ac:spMkLst>
+        </pc:spChg>
+        <pc:spChg chg="add mod">
+          <ac:chgData name="Simon Dufour" userId="38428de1-9cbc-422b-8b16-f4b0dc7c0437" providerId="ADAL" clId="{57236147-EF1D-4DE3-8D39-A4D9196631B0}" dt="2023-01-12T13:31:07.413" v="641" actId="164"/>
+          <ac:spMkLst>
+            <pc:docMk/>
+            <pc:sldMk cId="3446356298" sldId="260"/>
+            <ac:spMk id="33" creationId="{F8AA02AA-3D43-4B70-89CB-D3E2A9DC2E5B}"/>
+          </ac:spMkLst>
+        </pc:spChg>
+        <pc:spChg chg="add mod">
+          <ac:chgData name="Simon Dufour" userId="38428de1-9cbc-422b-8b16-f4b0dc7c0437" providerId="ADAL" clId="{57236147-EF1D-4DE3-8D39-A4D9196631B0}" dt="2023-01-12T13:31:07.413" v="641" actId="164"/>
+          <ac:spMkLst>
+            <pc:docMk/>
+            <pc:sldMk cId="3446356298" sldId="260"/>
+            <ac:spMk id="34" creationId="{A336B621-867E-4352-B29C-4B19E7C42236}"/>
+          </ac:spMkLst>
+        </pc:spChg>
+        <pc:spChg chg="add mod">
+          <ac:chgData name="Simon Dufour" userId="38428de1-9cbc-422b-8b16-f4b0dc7c0437" providerId="ADAL" clId="{57236147-EF1D-4DE3-8D39-A4D9196631B0}" dt="2023-01-12T13:31:07.413" v="641" actId="164"/>
+          <ac:spMkLst>
+            <pc:docMk/>
+            <pc:sldMk cId="3446356298" sldId="260"/>
+            <ac:spMk id="35" creationId="{832EE639-E917-4F84-83BE-FBC7A2D02B64}"/>
+          </ac:spMkLst>
+        </pc:spChg>
+        <pc:spChg chg="add mod">
+          <ac:chgData name="Simon Dufour" userId="38428de1-9cbc-422b-8b16-f4b0dc7c0437" providerId="ADAL" clId="{57236147-EF1D-4DE3-8D39-A4D9196631B0}" dt="2023-01-12T13:31:07.413" v="641" actId="164"/>
+          <ac:spMkLst>
+            <pc:docMk/>
+            <pc:sldMk cId="3446356298" sldId="260"/>
+            <ac:spMk id="37" creationId="{090827C5-63D4-4B2C-9BA2-3B98B8D35291}"/>
+          </ac:spMkLst>
+        </pc:spChg>
+        <pc:spChg chg="add mod">
+          <ac:chgData name="Simon Dufour" userId="38428de1-9cbc-422b-8b16-f4b0dc7c0437" providerId="ADAL" clId="{57236147-EF1D-4DE3-8D39-A4D9196631B0}" dt="2023-01-12T13:31:07.413" v="641" actId="164"/>
+          <ac:spMkLst>
+            <pc:docMk/>
+            <pc:sldMk cId="3446356298" sldId="260"/>
+            <ac:spMk id="39" creationId="{FB0B1EB0-5F27-4E53-8CE0-D9854A71CA2A}"/>
+          </ac:spMkLst>
+        </pc:spChg>
+        <pc:spChg chg="add mod">
+          <ac:chgData name="Simon Dufour" userId="38428de1-9cbc-422b-8b16-f4b0dc7c0437" providerId="ADAL" clId="{57236147-EF1D-4DE3-8D39-A4D9196631B0}" dt="2023-01-12T13:31:07.413" v="641" actId="164"/>
+          <ac:spMkLst>
+            <pc:docMk/>
+            <pc:sldMk cId="3446356298" sldId="260"/>
+            <ac:spMk id="50" creationId="{4E080541-EF83-46FE-B142-9F57FDA85291}"/>
+          </ac:spMkLst>
+        </pc:spChg>
+        <pc:spChg chg="add mod">
+          <ac:chgData name="Simon Dufour" userId="38428de1-9cbc-422b-8b16-f4b0dc7c0437" providerId="ADAL" clId="{57236147-EF1D-4DE3-8D39-A4D9196631B0}" dt="2023-01-12T13:31:07.413" v="641" actId="164"/>
+          <ac:spMkLst>
+            <pc:docMk/>
+            <pc:sldMk cId="3446356298" sldId="260"/>
+            <ac:spMk id="51" creationId="{630F4BDD-6C9B-476F-A44E-D072BCC5FC24}"/>
+          </ac:spMkLst>
+        </pc:spChg>
+        <pc:spChg chg="add mod">
+          <ac:chgData name="Simon Dufour" userId="38428de1-9cbc-422b-8b16-f4b0dc7c0437" providerId="ADAL" clId="{57236147-EF1D-4DE3-8D39-A4D9196631B0}" dt="2023-01-12T13:31:07.413" v="641" actId="164"/>
+          <ac:spMkLst>
+            <pc:docMk/>
+            <pc:sldMk cId="3446356298" sldId="260"/>
+            <ac:spMk id="56" creationId="{05C3CAA5-F58D-4A08-890E-828FEC5BF758}"/>
+          </ac:spMkLst>
+        </pc:spChg>
+        <pc:spChg chg="add mod">
+          <ac:chgData name="Simon Dufour" userId="38428de1-9cbc-422b-8b16-f4b0dc7c0437" providerId="ADAL" clId="{57236147-EF1D-4DE3-8D39-A4D9196631B0}" dt="2023-01-12T13:31:07.413" v="641" actId="164"/>
+          <ac:spMkLst>
+            <pc:docMk/>
+            <pc:sldMk cId="3446356298" sldId="260"/>
+            <ac:spMk id="57" creationId="{BBA1EFF8-3838-4317-9675-47B0021E3B6A}"/>
+          </ac:spMkLst>
+        </pc:spChg>
+        <pc:spChg chg="add mod">
+          <ac:chgData name="Simon Dufour" userId="38428de1-9cbc-422b-8b16-f4b0dc7c0437" providerId="ADAL" clId="{57236147-EF1D-4DE3-8D39-A4D9196631B0}" dt="2023-01-12T13:31:07.413" v="641" actId="164"/>
+          <ac:spMkLst>
+            <pc:docMk/>
+            <pc:sldMk cId="3446356298" sldId="260"/>
+            <ac:spMk id="58" creationId="{83ED49D2-F44F-471E-9621-FC487ED9225E}"/>
           </ac:spMkLst>
         </pc:spChg>
         <pc:grpChg chg="add mod">
-          <ac:chgData name="Dufour Simon" userId="38428de1-9cbc-422b-8b16-f4b0dc7c0437" providerId="ADAL" clId="{E8C959ED-9010-4EDC-901A-C1A4A80C5EEA}" dt="2021-05-07T14:05:09.589" v="13" actId="164"/>
+          <ac:chgData name="Simon Dufour" userId="38428de1-9cbc-422b-8b16-f4b0dc7c0437" providerId="ADAL" clId="{57236147-EF1D-4DE3-8D39-A4D9196631B0}" dt="2023-01-12T13:31:07.413" v="641" actId="164"/>
           <ac:grpSpMkLst>
             <pc:docMk/>
-            <pc:sldMk cId="10022089" sldId="258"/>
-            <ac:grpSpMk id="4" creationId="{4233AA93-831E-4949-A227-4C0258A3FBBC}"/>
+            <pc:sldMk cId="3446356298" sldId="260"/>
+            <ac:grpSpMk id="76" creationId="{A818E09D-C505-4426-9854-42769C963C56}"/>
           </ac:grpSpMkLst>
         </pc:grpChg>
-        <pc:grpChg chg="mod">
-          <ac:chgData name="Dufour Simon" userId="38428de1-9cbc-422b-8b16-f4b0dc7c0437" providerId="ADAL" clId="{E8C959ED-9010-4EDC-901A-C1A4A80C5EEA}" dt="2021-05-07T14:05:09.589" v="13" actId="164"/>
-          <ac:grpSpMkLst>
-            <pc:docMk/>
-            <pc:sldMk cId="10022089" sldId="258"/>
-            <ac:grpSpMk id="8" creationId="{00000000-0000-0000-0000-000000000000}"/>
-          </ac:grpSpMkLst>
-        </pc:grpChg>
-        <pc:picChg chg="mod modCrop">
-          <ac:chgData name="Dufour Simon" userId="38428de1-9cbc-422b-8b16-f4b0dc7c0437" providerId="ADAL" clId="{E8C959ED-9010-4EDC-901A-C1A4A80C5EEA}" dt="2021-05-07T14:04:16.264" v="3" actId="1076"/>
-          <ac:picMkLst>
-            <pc:docMk/>
-            <pc:sldMk cId="10022089" sldId="258"/>
-            <ac:picMk id="6" creationId="{00000000-0000-0000-0000-000000000000}"/>
-          </ac:picMkLst>
-        </pc:picChg>
         <pc:cxnChg chg="add mod">
-          <ac:chgData name="Dufour Simon" userId="38428de1-9cbc-422b-8b16-f4b0dc7c0437" providerId="ADAL" clId="{E8C959ED-9010-4EDC-901A-C1A4A80C5EEA}" dt="2021-05-07T14:05:09.589" v="13" actId="164"/>
+          <ac:chgData name="Simon Dufour" userId="38428de1-9cbc-422b-8b16-f4b0dc7c0437" providerId="ADAL" clId="{57236147-EF1D-4DE3-8D39-A4D9196631B0}" dt="2023-01-12T13:31:07.413" v="641" actId="164"/>
           <ac:cxnSpMkLst>
             <pc:docMk/>
-            <pc:sldMk cId="10022089" sldId="258"/>
-            <ac:cxnSpMk id="3" creationId="{3DFF696D-2BE4-4ED7-A7F3-F034138C74FF}"/>
+            <pc:sldMk cId="3446356298" sldId="260"/>
+            <ac:cxnSpMk id="10" creationId="{E1A48480-F086-46B1-9894-FF080F458189}"/>
+          </ac:cxnSpMkLst>
+        </pc:cxnChg>
+        <pc:cxnChg chg="add mod">
+          <ac:chgData name="Simon Dufour" userId="38428de1-9cbc-422b-8b16-f4b0dc7c0437" providerId="ADAL" clId="{57236147-EF1D-4DE3-8D39-A4D9196631B0}" dt="2023-01-12T13:31:07.413" v="641" actId="164"/>
+          <ac:cxnSpMkLst>
+            <pc:docMk/>
+            <pc:sldMk cId="3446356298" sldId="260"/>
+            <ac:cxnSpMk id="13" creationId="{BEA8B008-5615-40AD-B666-9DF613133D04}"/>
+          </ac:cxnSpMkLst>
+        </pc:cxnChg>
+        <pc:cxnChg chg="add mod">
+          <ac:chgData name="Simon Dufour" userId="38428de1-9cbc-422b-8b16-f4b0dc7c0437" providerId="ADAL" clId="{57236147-EF1D-4DE3-8D39-A4D9196631B0}" dt="2023-01-12T13:31:07.413" v="641" actId="164"/>
+          <ac:cxnSpMkLst>
+            <pc:docMk/>
+            <pc:sldMk cId="3446356298" sldId="260"/>
+            <ac:cxnSpMk id="15" creationId="{C6E830D1-426E-4F95-9739-9A44B9EA233D}"/>
+          </ac:cxnSpMkLst>
+        </pc:cxnChg>
+        <pc:cxnChg chg="add mod">
+          <ac:chgData name="Simon Dufour" userId="38428de1-9cbc-422b-8b16-f4b0dc7c0437" providerId="ADAL" clId="{57236147-EF1D-4DE3-8D39-A4D9196631B0}" dt="2023-01-12T13:31:07.413" v="641" actId="164"/>
+          <ac:cxnSpMkLst>
+            <pc:docMk/>
+            <pc:sldMk cId="3446356298" sldId="260"/>
+            <ac:cxnSpMk id="26" creationId="{489037E2-274A-4B13-A01F-6EB11D2C5A09}"/>
+          </ac:cxnSpMkLst>
+        </pc:cxnChg>
+        <pc:cxnChg chg="add mod">
+          <ac:chgData name="Simon Dufour" userId="38428de1-9cbc-422b-8b16-f4b0dc7c0437" providerId="ADAL" clId="{57236147-EF1D-4DE3-8D39-A4D9196631B0}" dt="2023-01-12T13:31:07.413" v="641" actId="164"/>
+          <ac:cxnSpMkLst>
+            <pc:docMk/>
+            <pc:sldMk cId="3446356298" sldId="260"/>
+            <ac:cxnSpMk id="30" creationId="{9FF17104-3C05-4A00-9C8D-E6973D6636BA}"/>
+          </ac:cxnSpMkLst>
+        </pc:cxnChg>
+        <pc:cxnChg chg="add mod">
+          <ac:chgData name="Simon Dufour" userId="38428de1-9cbc-422b-8b16-f4b0dc7c0437" providerId="ADAL" clId="{57236147-EF1D-4DE3-8D39-A4D9196631B0}" dt="2023-01-12T13:31:07.413" v="641" actId="164"/>
+          <ac:cxnSpMkLst>
+            <pc:docMk/>
+            <pc:sldMk cId="3446356298" sldId="260"/>
+            <ac:cxnSpMk id="36" creationId="{E7D28F39-DF2B-4CC3-99ED-D575252771F9}"/>
+          </ac:cxnSpMkLst>
+        </pc:cxnChg>
+        <pc:cxnChg chg="add mod">
+          <ac:chgData name="Simon Dufour" userId="38428de1-9cbc-422b-8b16-f4b0dc7c0437" providerId="ADAL" clId="{57236147-EF1D-4DE3-8D39-A4D9196631B0}" dt="2023-01-12T13:31:07.413" v="641" actId="164"/>
+          <ac:cxnSpMkLst>
+            <pc:docMk/>
+            <pc:sldMk cId="3446356298" sldId="260"/>
+            <ac:cxnSpMk id="38" creationId="{83A1F417-A82F-408D-9D3C-FE813657CD92}"/>
+          </ac:cxnSpMkLst>
+        </pc:cxnChg>
+        <pc:cxnChg chg="add del mod">
+          <ac:chgData name="Simon Dufour" userId="38428de1-9cbc-422b-8b16-f4b0dc7c0437" providerId="ADAL" clId="{57236147-EF1D-4DE3-8D39-A4D9196631B0}" dt="2023-01-12T13:28:48.391" v="583" actId="478"/>
+          <ac:cxnSpMkLst>
+            <pc:docMk/>
+            <pc:sldMk cId="3446356298" sldId="260"/>
+            <ac:cxnSpMk id="55" creationId="{58025163-3CF0-40F5-ACF8-122FD234FB83}"/>
+          </ac:cxnSpMkLst>
+        </pc:cxnChg>
+        <pc:cxnChg chg="add mod">
+          <ac:chgData name="Simon Dufour" userId="38428de1-9cbc-422b-8b16-f4b0dc7c0437" providerId="ADAL" clId="{57236147-EF1D-4DE3-8D39-A4D9196631B0}" dt="2023-01-12T13:31:07.413" v="641" actId="164"/>
+          <ac:cxnSpMkLst>
+            <pc:docMk/>
+            <pc:sldMk cId="3446356298" sldId="260"/>
+            <ac:cxnSpMk id="60" creationId="{8E9E775B-51BE-4E31-BBC4-BF7B6FBF1D12}"/>
+          </ac:cxnSpMkLst>
+        </pc:cxnChg>
+        <pc:cxnChg chg="add mod">
+          <ac:chgData name="Simon Dufour" userId="38428de1-9cbc-422b-8b16-f4b0dc7c0437" providerId="ADAL" clId="{57236147-EF1D-4DE3-8D39-A4D9196631B0}" dt="2023-01-12T13:31:07.413" v="641" actId="164"/>
+          <ac:cxnSpMkLst>
+            <pc:docMk/>
+            <pc:sldMk cId="3446356298" sldId="260"/>
+            <ac:cxnSpMk id="62" creationId="{84AB023A-3F52-4FBA-8C93-666C34AEE943}"/>
+          </ac:cxnSpMkLst>
+        </pc:cxnChg>
+        <pc:cxnChg chg="add mod">
+          <ac:chgData name="Simon Dufour" userId="38428de1-9cbc-422b-8b16-f4b0dc7c0437" providerId="ADAL" clId="{57236147-EF1D-4DE3-8D39-A4D9196631B0}" dt="2023-01-12T13:31:07.413" v="641" actId="164"/>
+          <ac:cxnSpMkLst>
+            <pc:docMk/>
+            <pc:sldMk cId="3446356298" sldId="260"/>
+            <ac:cxnSpMk id="65" creationId="{A3D2888F-A613-4C08-8F3F-E7502769AD5F}"/>
+          </ac:cxnSpMkLst>
+        </pc:cxnChg>
+        <pc:cxnChg chg="add mod">
+          <ac:chgData name="Simon Dufour" userId="38428de1-9cbc-422b-8b16-f4b0dc7c0437" providerId="ADAL" clId="{57236147-EF1D-4DE3-8D39-A4D9196631B0}" dt="2023-01-12T13:31:07.413" v="641" actId="164"/>
+          <ac:cxnSpMkLst>
+            <pc:docMk/>
+            <pc:sldMk cId="3446356298" sldId="260"/>
+            <ac:cxnSpMk id="67" creationId="{829AB7A0-EF38-4A74-8621-D663A076725D}"/>
+          </ac:cxnSpMkLst>
+        </pc:cxnChg>
+        <pc:cxnChg chg="add mod">
+          <ac:chgData name="Simon Dufour" userId="38428de1-9cbc-422b-8b16-f4b0dc7c0437" providerId="ADAL" clId="{57236147-EF1D-4DE3-8D39-A4D9196631B0}" dt="2023-01-12T13:31:07.413" v="641" actId="164"/>
+          <ac:cxnSpMkLst>
+            <pc:docMk/>
+            <pc:sldMk cId="3446356298" sldId="260"/>
+            <ac:cxnSpMk id="69" creationId="{6DE27CA1-3383-44D5-891C-B7980BAB3A8C}"/>
+          </ac:cxnSpMkLst>
+        </pc:cxnChg>
+        <pc:cxnChg chg="add mod">
+          <ac:chgData name="Simon Dufour" userId="38428de1-9cbc-422b-8b16-f4b0dc7c0437" providerId="ADAL" clId="{57236147-EF1D-4DE3-8D39-A4D9196631B0}" dt="2023-01-12T13:31:07.413" v="641" actId="164"/>
+          <ac:cxnSpMkLst>
+            <pc:docMk/>
+            <pc:sldMk cId="3446356298" sldId="260"/>
+            <ac:cxnSpMk id="71" creationId="{F862D585-0BE9-44DB-B710-79C0319B1A03}"/>
           </ac:cxnSpMkLst>
         </pc:cxnChg>
       </pc:sldChg>
@@ -306,7 +590,7 @@
           <a:p>
             <a:fld id="{154933BD-777F-4C95-B198-FFFB13F5157D}" type="datetimeFigureOut">
               <a:rPr lang="fr-CA" smtClean="0"/>
-              <a:t>2021-05-07</a:t>
+              <a:t>2023-01-12</a:t>
             </a:fld>
             <a:endParaRPr lang="fr-CA"/>
           </a:p>
@@ -476,7 +760,7 @@
           <a:p>
             <a:fld id="{154933BD-777F-4C95-B198-FFFB13F5157D}" type="datetimeFigureOut">
               <a:rPr lang="fr-CA" smtClean="0"/>
-              <a:t>2021-05-07</a:t>
+              <a:t>2023-01-12</a:t>
             </a:fld>
             <a:endParaRPr lang="fr-CA"/>
           </a:p>
@@ -656,7 +940,7 @@
           <a:p>
             <a:fld id="{154933BD-777F-4C95-B198-FFFB13F5157D}" type="datetimeFigureOut">
               <a:rPr lang="fr-CA" smtClean="0"/>
-              <a:t>2021-05-07</a:t>
+              <a:t>2023-01-12</a:t>
             </a:fld>
             <a:endParaRPr lang="fr-CA"/>
           </a:p>
@@ -826,7 +1110,7 @@
           <a:p>
             <a:fld id="{154933BD-777F-4C95-B198-FFFB13F5157D}" type="datetimeFigureOut">
               <a:rPr lang="fr-CA" smtClean="0"/>
-              <a:t>2021-05-07</a:t>
+              <a:t>2023-01-12</a:t>
             </a:fld>
             <a:endParaRPr lang="fr-CA"/>
           </a:p>
@@ -1072,7 +1356,7 @@
           <a:p>
             <a:fld id="{154933BD-777F-4C95-B198-FFFB13F5157D}" type="datetimeFigureOut">
               <a:rPr lang="fr-CA" smtClean="0"/>
-              <a:t>2021-05-07</a:t>
+              <a:t>2023-01-12</a:t>
             </a:fld>
             <a:endParaRPr lang="fr-CA"/>
           </a:p>
@@ -1304,7 +1588,7 @@
           <a:p>
             <a:fld id="{154933BD-777F-4C95-B198-FFFB13F5157D}" type="datetimeFigureOut">
               <a:rPr lang="fr-CA" smtClean="0"/>
-              <a:t>2021-05-07</a:t>
+              <a:t>2023-01-12</a:t>
             </a:fld>
             <a:endParaRPr lang="fr-CA"/>
           </a:p>
@@ -1671,7 +1955,7 @@
           <a:p>
             <a:fld id="{154933BD-777F-4C95-B198-FFFB13F5157D}" type="datetimeFigureOut">
               <a:rPr lang="fr-CA" smtClean="0"/>
-              <a:t>2021-05-07</a:t>
+              <a:t>2023-01-12</a:t>
             </a:fld>
             <a:endParaRPr lang="fr-CA"/>
           </a:p>
@@ -1789,7 +2073,7 @@
           <a:p>
             <a:fld id="{154933BD-777F-4C95-B198-FFFB13F5157D}" type="datetimeFigureOut">
               <a:rPr lang="fr-CA" smtClean="0"/>
-              <a:t>2021-05-07</a:t>
+              <a:t>2023-01-12</a:t>
             </a:fld>
             <a:endParaRPr lang="fr-CA"/>
           </a:p>
@@ -1884,7 +2168,7 @@
           <a:p>
             <a:fld id="{154933BD-777F-4C95-B198-FFFB13F5157D}" type="datetimeFigureOut">
               <a:rPr lang="fr-CA" smtClean="0"/>
-              <a:t>2021-05-07</a:t>
+              <a:t>2023-01-12</a:t>
             </a:fld>
             <a:endParaRPr lang="fr-CA"/>
           </a:p>
@@ -2161,7 +2445,7 @@
           <a:p>
             <a:fld id="{154933BD-777F-4C95-B198-FFFB13F5157D}" type="datetimeFigureOut">
               <a:rPr lang="fr-CA" smtClean="0"/>
-              <a:t>2021-05-07</a:t>
+              <a:t>2023-01-12</a:t>
             </a:fld>
             <a:endParaRPr lang="fr-CA"/>
           </a:p>
@@ -2414,7 +2698,7 @@
           <a:p>
             <a:fld id="{154933BD-777F-4C95-B198-FFFB13F5157D}" type="datetimeFigureOut">
               <a:rPr lang="fr-CA" smtClean="0"/>
-              <a:t>2021-05-07</a:t>
+              <a:t>2023-01-12</a:t>
             </a:fld>
             <a:endParaRPr lang="fr-CA"/>
           </a:p>
@@ -2627,7 +2911,7 @@
           <a:p>
             <a:fld id="{154933BD-777F-4C95-B198-FFFB13F5157D}" type="datetimeFigureOut">
               <a:rPr lang="fr-CA" smtClean="0"/>
-              <a:t>2021-05-07</a:t>
+              <a:t>2023-01-12</a:t>
             </a:fld>
             <a:endParaRPr lang="fr-CA"/>
           </a:p>
@@ -4521,6 +4805,1554 @@
 </p:sld>
 </file>
 
+<file path=ppt/slides/slide4.xml><?xml version="1.0" encoding="utf-8"?>
+<p:sld xmlns:a="http://schemas.openxmlformats.org/drawingml/2006/main" xmlns:r="http://schemas.openxmlformats.org/officeDocument/2006/relationships" xmlns:p="http://schemas.openxmlformats.org/presentationml/2006/main">
+  <p:cSld>
+    <p:spTree>
+      <p:nvGrpSpPr>
+        <p:cNvPr id="1" name=""/>
+        <p:cNvGrpSpPr/>
+        <p:nvPr/>
+      </p:nvGrpSpPr>
+      <p:grpSpPr>
+        <a:xfrm>
+          <a:off x="0" y="0"/>
+          <a:ext cx="0" cy="0"/>
+          <a:chOff x="0" y="0"/>
+          <a:chExt cx="0" cy="0"/>
+        </a:xfrm>
+      </p:grpSpPr>
+      <p:grpSp>
+        <p:nvGrpSpPr>
+          <p:cNvPr id="76" name="Groupe 75">
+            <a:extLst>
+              <a:ext uri="{FF2B5EF4-FFF2-40B4-BE49-F238E27FC236}">
+                <a16:creationId xmlns:a16="http://schemas.microsoft.com/office/drawing/2014/main" id="{A818E09D-C505-4426-9854-42769C963C56}"/>
+              </a:ext>
+            </a:extLst>
+          </p:cNvPr>
+          <p:cNvGrpSpPr/>
+          <p:nvPr/>
+        </p:nvGrpSpPr>
+        <p:grpSpPr>
+          <a:xfrm>
+            <a:off x="351184" y="238539"/>
+            <a:ext cx="11308079" cy="8101680"/>
+            <a:chOff x="351184" y="238539"/>
+            <a:chExt cx="11308079" cy="8101680"/>
+          </a:xfrm>
+        </p:grpSpPr>
+        <p:sp>
+          <p:nvSpPr>
+            <p:cNvPr id="4" name="ZoneTexte 3">
+              <a:extLst>
+                <a:ext uri="{FF2B5EF4-FFF2-40B4-BE49-F238E27FC236}">
+                  <a16:creationId xmlns:a16="http://schemas.microsoft.com/office/drawing/2014/main" id="{55077265-B3C7-450C-9B16-552B487BA725}"/>
+                </a:ext>
+              </a:extLst>
+            </p:cNvPr>
+            <p:cNvSpPr txBox="1"/>
+            <p:nvPr/>
+          </p:nvSpPr>
+          <p:spPr>
+            <a:xfrm>
+              <a:off x="4094922" y="238539"/>
+              <a:ext cx="3721210" cy="408623"/>
+            </a:xfrm>
+            <a:prstGeom prst="roundRect">
+              <a:avLst/>
+            </a:prstGeom>
+            <a:ln cap="rnd"/>
+          </p:spPr>
+          <p:style>
+            <a:lnRef idx="3">
+              <a:schemeClr val="lt1"/>
+            </a:lnRef>
+            <a:fillRef idx="1">
+              <a:schemeClr val="accent1"/>
+            </a:fillRef>
+            <a:effectRef idx="1">
+              <a:schemeClr val="accent1"/>
+            </a:effectRef>
+            <a:fontRef idx="minor">
+              <a:schemeClr val="lt1"/>
+            </a:fontRef>
+          </p:style>
+          <p:txBody>
+            <a:bodyPr wrap="square" rtlCol="0">
+              <a:spAutoFit/>
+            </a:bodyPr>
+            <a:lstStyle/>
+            <a:p>
+              <a:pPr algn="ctr"/>
+              <a:r>
+                <a:rPr lang="fr-CA" dirty="0"/>
+                <a:t>Compte d’un nombre d’évènements</a:t>
+              </a:r>
+            </a:p>
+          </p:txBody>
+        </p:sp>
+        <p:sp>
+          <p:nvSpPr>
+            <p:cNvPr id="6" name="ZoneTexte 5">
+              <a:extLst>
+                <a:ext uri="{FF2B5EF4-FFF2-40B4-BE49-F238E27FC236}">
+                  <a16:creationId xmlns:a16="http://schemas.microsoft.com/office/drawing/2014/main" id="{D7A54963-62AD-4DA9-8E6A-97BBEDE64C4D}"/>
+                </a:ext>
+              </a:extLst>
+            </p:cNvPr>
+            <p:cNvSpPr txBox="1"/>
+            <p:nvPr/>
+          </p:nvSpPr>
+          <p:spPr>
+            <a:xfrm>
+              <a:off x="4821141" y="1166124"/>
+              <a:ext cx="2268771" cy="408623"/>
+            </a:xfrm>
+            <a:prstGeom prst="roundRect">
+              <a:avLst/>
+            </a:prstGeom>
+            <a:ln cap="rnd"/>
+          </p:spPr>
+          <p:style>
+            <a:lnRef idx="3">
+              <a:schemeClr val="lt1"/>
+            </a:lnRef>
+            <a:fillRef idx="1">
+              <a:schemeClr val="accent1"/>
+            </a:fillRef>
+            <a:effectRef idx="1">
+              <a:schemeClr val="accent1"/>
+            </a:effectRef>
+            <a:fontRef idx="minor">
+              <a:schemeClr val="lt1"/>
+            </a:fontRef>
+          </p:style>
+          <p:txBody>
+            <a:bodyPr wrap="square" rtlCol="0">
+              <a:spAutoFit/>
+            </a:bodyPr>
+            <a:lstStyle/>
+            <a:p>
+              <a:pPr algn="ctr"/>
+              <a:r>
+                <a:rPr lang="fr-CA" dirty="0"/>
+                <a:t>Variance ≈ moyenne?</a:t>
+              </a:r>
+            </a:p>
+          </p:txBody>
+        </p:sp>
+        <p:sp>
+          <p:nvSpPr>
+            <p:cNvPr id="8" name="ZoneTexte 7">
+              <a:extLst>
+                <a:ext uri="{FF2B5EF4-FFF2-40B4-BE49-F238E27FC236}">
+                  <a16:creationId xmlns:a16="http://schemas.microsoft.com/office/drawing/2014/main" id="{9C5FDDA2-6D2A-4A55-8F0F-03763693F306}"/>
+                </a:ext>
+              </a:extLst>
+            </p:cNvPr>
+            <p:cNvSpPr txBox="1"/>
+            <p:nvPr/>
+          </p:nvSpPr>
+          <p:spPr>
+            <a:xfrm>
+              <a:off x="1598213" y="2093709"/>
+              <a:ext cx="1876507" cy="715089"/>
+            </a:xfrm>
+            <a:prstGeom prst="roundRect">
+              <a:avLst/>
+            </a:prstGeom>
+            <a:ln cap="rnd"/>
+          </p:spPr>
+          <p:style>
+            <a:lnRef idx="3">
+              <a:schemeClr val="lt1"/>
+            </a:lnRef>
+            <a:fillRef idx="1">
+              <a:schemeClr val="accent1"/>
+            </a:fillRef>
+            <a:effectRef idx="1">
+              <a:schemeClr val="accent1"/>
+            </a:effectRef>
+            <a:fontRef idx="minor">
+              <a:schemeClr val="lt1"/>
+            </a:fontRef>
+          </p:style>
+          <p:txBody>
+            <a:bodyPr wrap="square" rtlCol="0">
+              <a:spAutoFit/>
+            </a:bodyPr>
+            <a:lstStyle/>
+            <a:p>
+              <a:pPr algn="ctr"/>
+              <a:r>
+                <a:rPr lang="fr-CA" dirty="0"/>
+                <a:t>Problème avec les zéros?</a:t>
+              </a:r>
+            </a:p>
+          </p:txBody>
+        </p:sp>
+        <p:cxnSp>
+          <p:nvCxnSpPr>
+            <p:cNvPr id="10" name="Connecteur droit avec flèche 9">
+              <a:extLst>
+                <a:ext uri="{FF2B5EF4-FFF2-40B4-BE49-F238E27FC236}">
+                  <a16:creationId xmlns:a16="http://schemas.microsoft.com/office/drawing/2014/main" id="{E1A48480-F086-46B1-9894-FF080F458189}"/>
+                </a:ext>
+              </a:extLst>
+            </p:cNvPr>
+            <p:cNvCxnSpPr>
+              <a:stCxn id="4" idx="2"/>
+              <a:endCxn id="6" idx="0"/>
+            </p:cNvCxnSpPr>
+            <p:nvPr/>
+          </p:nvCxnSpPr>
+          <p:spPr>
+            <a:xfrm>
+              <a:off x="5955527" y="647162"/>
+              <a:ext cx="0" cy="518962"/>
+            </a:xfrm>
+            <a:prstGeom prst="straightConnector1">
+              <a:avLst/>
+            </a:prstGeom>
+            <a:ln>
+              <a:tailEnd type="triangle"/>
+            </a:ln>
+          </p:spPr>
+          <p:style>
+            <a:lnRef idx="1">
+              <a:schemeClr val="accent1"/>
+            </a:lnRef>
+            <a:fillRef idx="0">
+              <a:schemeClr val="accent1"/>
+            </a:fillRef>
+            <a:effectRef idx="0">
+              <a:schemeClr val="accent1"/>
+            </a:effectRef>
+            <a:fontRef idx="minor">
+              <a:schemeClr val="tx1"/>
+            </a:fontRef>
+          </p:style>
+        </p:cxnSp>
+        <p:cxnSp>
+          <p:nvCxnSpPr>
+            <p:cNvPr id="13" name="Connecteur : en angle 12">
+              <a:extLst>
+                <a:ext uri="{FF2B5EF4-FFF2-40B4-BE49-F238E27FC236}">
+                  <a16:creationId xmlns:a16="http://schemas.microsoft.com/office/drawing/2014/main" id="{BEA8B008-5615-40AD-B666-9DF613133D04}"/>
+                </a:ext>
+              </a:extLst>
+            </p:cNvPr>
+            <p:cNvCxnSpPr>
+              <a:cxnSpLocks/>
+              <a:stCxn id="6" idx="2"/>
+              <a:endCxn id="8" idx="0"/>
+            </p:cNvCxnSpPr>
+            <p:nvPr/>
+          </p:nvCxnSpPr>
+          <p:spPr>
+            <a:xfrm rot="5400000">
+              <a:off x="3986516" y="124698"/>
+              <a:ext cx="518962" cy="3419060"/>
+            </a:xfrm>
+            <a:prstGeom prst="bentConnector3">
+              <a:avLst/>
+            </a:prstGeom>
+            <a:ln>
+              <a:tailEnd type="triangle"/>
+            </a:ln>
+          </p:spPr>
+          <p:style>
+            <a:lnRef idx="1">
+              <a:schemeClr val="accent1"/>
+            </a:lnRef>
+            <a:fillRef idx="0">
+              <a:schemeClr val="accent1"/>
+            </a:fillRef>
+            <a:effectRef idx="0">
+              <a:schemeClr val="accent1"/>
+            </a:effectRef>
+            <a:fontRef idx="minor">
+              <a:schemeClr val="tx1"/>
+            </a:fontRef>
+          </p:style>
+        </p:cxnSp>
+        <p:cxnSp>
+          <p:nvCxnSpPr>
+            <p:cNvPr id="15" name="Connecteur : en angle 14">
+              <a:extLst>
+                <a:ext uri="{FF2B5EF4-FFF2-40B4-BE49-F238E27FC236}">
+                  <a16:creationId xmlns:a16="http://schemas.microsoft.com/office/drawing/2014/main" id="{C6E830D1-426E-4F95-9739-9A44B9EA233D}"/>
+                </a:ext>
+              </a:extLst>
+            </p:cNvPr>
+            <p:cNvCxnSpPr>
+              <a:cxnSpLocks/>
+              <a:stCxn id="6" idx="2"/>
+              <a:endCxn id="33" idx="0"/>
+            </p:cNvCxnSpPr>
+            <p:nvPr/>
+          </p:nvCxnSpPr>
+          <p:spPr>
+            <a:xfrm rot="16200000" flipH="1">
+              <a:off x="6837058" y="693215"/>
+              <a:ext cx="518962" cy="2282025"/>
+            </a:xfrm>
+            <a:prstGeom prst="bentConnector3">
+              <a:avLst/>
+            </a:prstGeom>
+            <a:ln>
+              <a:tailEnd type="triangle"/>
+            </a:ln>
+          </p:spPr>
+          <p:style>
+            <a:lnRef idx="1">
+              <a:schemeClr val="accent1"/>
+            </a:lnRef>
+            <a:fillRef idx="0">
+              <a:schemeClr val="accent1"/>
+            </a:fillRef>
+            <a:effectRef idx="0">
+              <a:schemeClr val="accent1"/>
+            </a:effectRef>
+            <a:fontRef idx="minor">
+              <a:schemeClr val="tx1"/>
+            </a:fontRef>
+          </p:style>
+        </p:cxnSp>
+        <p:sp>
+          <p:nvSpPr>
+            <p:cNvPr id="16" name="ZoneTexte 15">
+              <a:extLst>
+                <a:ext uri="{FF2B5EF4-FFF2-40B4-BE49-F238E27FC236}">
+                  <a16:creationId xmlns:a16="http://schemas.microsoft.com/office/drawing/2014/main" id="{51D5F132-1C2B-47E5-9EBA-A5B5B37CC996}"/>
+                </a:ext>
+              </a:extLst>
+            </p:cNvPr>
+            <p:cNvSpPr txBox="1"/>
+            <p:nvPr/>
+          </p:nvSpPr>
+          <p:spPr>
+            <a:xfrm>
+              <a:off x="3951798" y="1463040"/>
+              <a:ext cx="535388" cy="369332"/>
+            </a:xfrm>
+            <a:prstGeom prst="rect">
+              <a:avLst/>
+            </a:prstGeom>
+            <a:noFill/>
+          </p:spPr>
+          <p:txBody>
+            <a:bodyPr wrap="square" rtlCol="0">
+              <a:spAutoFit/>
+            </a:bodyPr>
+            <a:lstStyle/>
+            <a:p>
+              <a:r>
+                <a:rPr lang="fr-CA" dirty="0"/>
+                <a:t>Oui</a:t>
+              </a:r>
+            </a:p>
+          </p:txBody>
+        </p:sp>
+        <p:sp>
+          <p:nvSpPr>
+            <p:cNvPr id="17" name="ZoneTexte 16">
+              <a:extLst>
+                <a:ext uri="{FF2B5EF4-FFF2-40B4-BE49-F238E27FC236}">
+                  <a16:creationId xmlns:a16="http://schemas.microsoft.com/office/drawing/2014/main" id="{5E4F38DF-5B1F-4478-9498-60D951B46CF5}"/>
+                </a:ext>
+              </a:extLst>
+            </p:cNvPr>
+            <p:cNvSpPr txBox="1"/>
+            <p:nvPr/>
+          </p:nvSpPr>
+          <p:spPr>
+            <a:xfrm>
+              <a:off x="7146567" y="1463040"/>
+              <a:ext cx="748085" cy="369332"/>
+            </a:xfrm>
+            <a:prstGeom prst="rect">
+              <a:avLst/>
+            </a:prstGeom>
+            <a:noFill/>
+          </p:spPr>
+          <p:txBody>
+            <a:bodyPr wrap="square" rtlCol="0">
+              <a:spAutoFit/>
+            </a:bodyPr>
+            <a:lstStyle/>
+            <a:p>
+              <a:r>
+                <a:rPr lang="fr-CA" dirty="0"/>
+                <a:t>Non</a:t>
+              </a:r>
+            </a:p>
+          </p:txBody>
+        </p:sp>
+        <p:sp>
+          <p:nvSpPr>
+            <p:cNvPr id="18" name="ZoneTexte 17">
+              <a:extLst>
+                <a:ext uri="{FF2B5EF4-FFF2-40B4-BE49-F238E27FC236}">
+                  <a16:creationId xmlns:a16="http://schemas.microsoft.com/office/drawing/2014/main" id="{69495860-F8D9-4C84-9855-1C3C8365BE7C}"/>
+                </a:ext>
+              </a:extLst>
+            </p:cNvPr>
+            <p:cNvSpPr txBox="1"/>
+            <p:nvPr/>
+          </p:nvSpPr>
+          <p:spPr>
+            <a:xfrm>
+              <a:off x="351184" y="3426744"/>
+              <a:ext cx="1644594" cy="408623"/>
+            </a:xfrm>
+            <a:prstGeom prst="roundRect">
+              <a:avLst/>
+            </a:prstGeom>
+            <a:ln cap="rnd"/>
+          </p:spPr>
+          <p:style>
+            <a:lnRef idx="3">
+              <a:schemeClr val="lt1"/>
+            </a:lnRef>
+            <a:fillRef idx="1">
+              <a:schemeClr val="accent1"/>
+            </a:fillRef>
+            <a:effectRef idx="1">
+              <a:schemeClr val="accent1"/>
+            </a:effectRef>
+            <a:fontRef idx="minor">
+              <a:schemeClr val="lt1"/>
+            </a:fontRef>
+          </p:style>
+          <p:txBody>
+            <a:bodyPr wrap="square" rtlCol="0">
+              <a:spAutoFit/>
+            </a:bodyPr>
+            <a:lstStyle/>
+            <a:p>
+              <a:pPr algn="ctr"/>
+              <a:r>
+                <a:rPr lang="fr-CA" dirty="0"/>
+                <a:t>Poisson</a:t>
+              </a:r>
+            </a:p>
+          </p:txBody>
+        </p:sp>
+        <p:sp>
+          <p:nvSpPr>
+            <p:cNvPr id="21" name="ZoneTexte 20">
+              <a:extLst>
+                <a:ext uri="{FF2B5EF4-FFF2-40B4-BE49-F238E27FC236}">
+                  <a16:creationId xmlns:a16="http://schemas.microsoft.com/office/drawing/2014/main" id="{F33A9EE8-A056-4880-BE3D-14F269452A79}"/>
+                </a:ext>
+              </a:extLst>
+            </p:cNvPr>
+            <p:cNvSpPr txBox="1"/>
+            <p:nvPr/>
+          </p:nvSpPr>
+          <p:spPr>
+            <a:xfrm>
+              <a:off x="2536466" y="3426744"/>
+              <a:ext cx="2565620" cy="1021556"/>
+            </a:xfrm>
+            <a:prstGeom prst="roundRect">
+              <a:avLst/>
+            </a:prstGeom>
+            <a:ln cap="rnd"/>
+          </p:spPr>
+          <p:style>
+            <a:lnRef idx="3">
+              <a:schemeClr val="lt1"/>
+            </a:lnRef>
+            <a:fillRef idx="1">
+              <a:schemeClr val="accent1"/>
+            </a:fillRef>
+            <a:effectRef idx="1">
+              <a:schemeClr val="accent1"/>
+            </a:effectRef>
+            <a:fontRef idx="minor">
+              <a:schemeClr val="lt1"/>
+            </a:fontRef>
+          </p:style>
+          <p:txBody>
+            <a:bodyPr wrap="square" rtlCol="0">
+              <a:spAutoFit/>
+            </a:bodyPr>
+            <a:lstStyle/>
+            <a:p>
+              <a:pPr algn="ctr"/>
+              <a:r>
+                <a:rPr lang="fr-CA" dirty="0"/>
+                <a:t>Modèle zéros-enflés</a:t>
+              </a:r>
+            </a:p>
+            <a:p>
+              <a:pPr algn="ctr"/>
+              <a:r>
+                <a:rPr lang="fr-CA" dirty="0"/>
+                <a:t>Modèle « </a:t>
+              </a:r>
+              <a:r>
+                <a:rPr lang="fr-CA" dirty="0" err="1"/>
+                <a:t>Hurdle</a:t>
+              </a:r>
+              <a:r>
+                <a:rPr lang="fr-CA" dirty="0"/>
+                <a:t> »</a:t>
+              </a:r>
+            </a:p>
+            <a:p>
+              <a:pPr algn="ctr"/>
+              <a:r>
+                <a:rPr lang="fr-CA" dirty="0"/>
+                <a:t>Modèle zéros-tronqués</a:t>
+              </a:r>
+            </a:p>
+          </p:txBody>
+        </p:sp>
+        <p:cxnSp>
+          <p:nvCxnSpPr>
+            <p:cNvPr id="26" name="Connecteur : en angle 25">
+              <a:extLst>
+                <a:ext uri="{FF2B5EF4-FFF2-40B4-BE49-F238E27FC236}">
+                  <a16:creationId xmlns:a16="http://schemas.microsoft.com/office/drawing/2014/main" id="{489037E2-274A-4B13-A01F-6EB11D2C5A09}"/>
+                </a:ext>
+              </a:extLst>
+            </p:cNvPr>
+            <p:cNvCxnSpPr>
+              <a:stCxn id="8" idx="2"/>
+              <a:endCxn id="18" idx="0"/>
+            </p:cNvCxnSpPr>
+            <p:nvPr/>
+          </p:nvCxnSpPr>
+          <p:spPr>
+            <a:xfrm rot="5400000">
+              <a:off x="1546001" y="2436278"/>
+              <a:ext cx="617946" cy="1362986"/>
+            </a:xfrm>
+            <a:prstGeom prst="bentConnector3">
+              <a:avLst/>
+            </a:prstGeom>
+            <a:ln>
+              <a:tailEnd type="triangle"/>
+            </a:ln>
+          </p:spPr>
+          <p:style>
+            <a:lnRef idx="1">
+              <a:schemeClr val="accent1"/>
+            </a:lnRef>
+            <a:fillRef idx="0">
+              <a:schemeClr val="accent1"/>
+            </a:fillRef>
+            <a:effectRef idx="0">
+              <a:schemeClr val="accent1"/>
+            </a:effectRef>
+            <a:fontRef idx="minor">
+              <a:schemeClr val="tx1"/>
+            </a:fontRef>
+          </p:style>
+        </p:cxnSp>
+        <p:sp>
+          <p:nvSpPr>
+            <p:cNvPr id="28" name="ZoneTexte 27">
+              <a:extLst>
+                <a:ext uri="{FF2B5EF4-FFF2-40B4-BE49-F238E27FC236}">
+                  <a16:creationId xmlns:a16="http://schemas.microsoft.com/office/drawing/2014/main" id="{F3823DAD-A1F6-4E37-BF8D-C6B38AF687F4}"/>
+                </a:ext>
+              </a:extLst>
+            </p:cNvPr>
+            <p:cNvSpPr txBox="1"/>
+            <p:nvPr/>
+          </p:nvSpPr>
+          <p:spPr>
+            <a:xfrm>
+              <a:off x="1480931" y="2799266"/>
+              <a:ext cx="748085" cy="369332"/>
+            </a:xfrm>
+            <a:prstGeom prst="rect">
+              <a:avLst/>
+            </a:prstGeom>
+            <a:noFill/>
+          </p:spPr>
+          <p:txBody>
+            <a:bodyPr wrap="square" rtlCol="0">
+              <a:spAutoFit/>
+            </a:bodyPr>
+            <a:lstStyle/>
+            <a:p>
+              <a:r>
+                <a:rPr lang="fr-CA" dirty="0"/>
+                <a:t>Non</a:t>
+              </a:r>
+            </a:p>
+          </p:txBody>
+        </p:sp>
+        <p:cxnSp>
+          <p:nvCxnSpPr>
+            <p:cNvPr id="30" name="Connecteur : en angle 29">
+              <a:extLst>
+                <a:ext uri="{FF2B5EF4-FFF2-40B4-BE49-F238E27FC236}">
+                  <a16:creationId xmlns:a16="http://schemas.microsoft.com/office/drawing/2014/main" id="{9FF17104-3C05-4A00-9C8D-E6973D6636BA}"/>
+                </a:ext>
+              </a:extLst>
+            </p:cNvPr>
+            <p:cNvCxnSpPr>
+              <a:stCxn id="8" idx="2"/>
+              <a:endCxn id="21" idx="0"/>
+            </p:cNvCxnSpPr>
+            <p:nvPr/>
+          </p:nvCxnSpPr>
+          <p:spPr>
+            <a:xfrm rot="16200000" flipH="1">
+              <a:off x="2868898" y="2476366"/>
+              <a:ext cx="617946" cy="1282809"/>
+            </a:xfrm>
+            <a:prstGeom prst="bentConnector3">
+              <a:avLst/>
+            </a:prstGeom>
+            <a:ln>
+              <a:tailEnd type="triangle"/>
+            </a:ln>
+          </p:spPr>
+          <p:style>
+            <a:lnRef idx="1">
+              <a:schemeClr val="accent1"/>
+            </a:lnRef>
+            <a:fillRef idx="0">
+              <a:schemeClr val="accent1"/>
+            </a:fillRef>
+            <a:effectRef idx="0">
+              <a:schemeClr val="accent1"/>
+            </a:effectRef>
+            <a:fontRef idx="minor">
+              <a:schemeClr val="tx1"/>
+            </a:fontRef>
+          </p:style>
+        </p:cxnSp>
+        <p:sp>
+          <p:nvSpPr>
+            <p:cNvPr id="32" name="ZoneTexte 31">
+              <a:extLst>
+                <a:ext uri="{FF2B5EF4-FFF2-40B4-BE49-F238E27FC236}">
+                  <a16:creationId xmlns:a16="http://schemas.microsoft.com/office/drawing/2014/main" id="{DDBFBF51-64A5-4114-9676-C68B922B4858}"/>
+                </a:ext>
+              </a:extLst>
+            </p:cNvPr>
+            <p:cNvSpPr txBox="1"/>
+            <p:nvPr/>
+          </p:nvSpPr>
+          <p:spPr>
+            <a:xfrm>
+              <a:off x="3016195" y="2811052"/>
+              <a:ext cx="535388" cy="369332"/>
+            </a:xfrm>
+            <a:prstGeom prst="rect">
+              <a:avLst/>
+            </a:prstGeom>
+            <a:noFill/>
+          </p:spPr>
+          <p:txBody>
+            <a:bodyPr wrap="square" rtlCol="0">
+              <a:spAutoFit/>
+            </a:bodyPr>
+            <a:lstStyle/>
+            <a:p>
+              <a:r>
+                <a:rPr lang="fr-CA" dirty="0"/>
+                <a:t>Oui</a:t>
+              </a:r>
+            </a:p>
+          </p:txBody>
+        </p:sp>
+        <p:sp>
+          <p:nvSpPr>
+            <p:cNvPr id="33" name="ZoneTexte 32">
+              <a:extLst>
+                <a:ext uri="{FF2B5EF4-FFF2-40B4-BE49-F238E27FC236}">
+                  <a16:creationId xmlns:a16="http://schemas.microsoft.com/office/drawing/2014/main" id="{F8AA02AA-3D43-4B70-89CB-D3E2A9DC2E5B}"/>
+                </a:ext>
+              </a:extLst>
+            </p:cNvPr>
+            <p:cNvSpPr txBox="1"/>
+            <p:nvPr/>
+          </p:nvSpPr>
+          <p:spPr>
+            <a:xfrm>
+              <a:off x="7299298" y="2093709"/>
+              <a:ext cx="1876507" cy="715089"/>
+            </a:xfrm>
+            <a:prstGeom prst="roundRect">
+              <a:avLst/>
+            </a:prstGeom>
+            <a:ln cap="rnd"/>
+          </p:spPr>
+          <p:style>
+            <a:lnRef idx="3">
+              <a:schemeClr val="lt1"/>
+            </a:lnRef>
+            <a:fillRef idx="1">
+              <a:schemeClr val="accent1"/>
+            </a:fillRef>
+            <a:effectRef idx="1">
+              <a:schemeClr val="accent1"/>
+            </a:effectRef>
+            <a:fontRef idx="minor">
+              <a:schemeClr val="lt1"/>
+            </a:fontRef>
+          </p:style>
+          <p:txBody>
+            <a:bodyPr wrap="square" rtlCol="0">
+              <a:spAutoFit/>
+            </a:bodyPr>
+            <a:lstStyle/>
+            <a:p>
+              <a:pPr algn="ctr"/>
+              <a:r>
+                <a:rPr lang="fr-CA" dirty="0"/>
+                <a:t>Problème avec les zéros?</a:t>
+              </a:r>
+            </a:p>
+          </p:txBody>
+        </p:sp>
+        <p:sp>
+          <p:nvSpPr>
+            <p:cNvPr id="34" name="ZoneTexte 33">
+              <a:extLst>
+                <a:ext uri="{FF2B5EF4-FFF2-40B4-BE49-F238E27FC236}">
+                  <a16:creationId xmlns:a16="http://schemas.microsoft.com/office/drawing/2014/main" id="{A336B621-867E-4352-B29C-4B19E7C42236}"/>
+                </a:ext>
+              </a:extLst>
+            </p:cNvPr>
+            <p:cNvSpPr txBox="1"/>
+            <p:nvPr/>
+          </p:nvSpPr>
+          <p:spPr>
+            <a:xfrm>
+              <a:off x="5409536" y="3426744"/>
+              <a:ext cx="2138902" cy="408623"/>
+            </a:xfrm>
+            <a:prstGeom prst="roundRect">
+              <a:avLst/>
+            </a:prstGeom>
+            <a:ln cap="rnd"/>
+          </p:spPr>
+          <p:style>
+            <a:lnRef idx="3">
+              <a:schemeClr val="lt1"/>
+            </a:lnRef>
+            <a:fillRef idx="1">
+              <a:schemeClr val="accent1"/>
+            </a:fillRef>
+            <a:effectRef idx="1">
+              <a:schemeClr val="accent1"/>
+            </a:effectRef>
+            <a:fontRef idx="minor">
+              <a:schemeClr val="lt1"/>
+            </a:fontRef>
+          </p:style>
+          <p:txBody>
+            <a:bodyPr wrap="square" rtlCol="0">
+              <a:spAutoFit/>
+            </a:bodyPr>
+            <a:lstStyle/>
+            <a:p>
+              <a:pPr algn="ctr"/>
+              <a:r>
+                <a:rPr lang="fr-CA" dirty="0"/>
+                <a:t>Binomiale négative</a:t>
+              </a:r>
+            </a:p>
+          </p:txBody>
+        </p:sp>
+        <p:sp>
+          <p:nvSpPr>
+            <p:cNvPr id="35" name="ZoneTexte 34">
+              <a:extLst>
+                <a:ext uri="{FF2B5EF4-FFF2-40B4-BE49-F238E27FC236}">
+                  <a16:creationId xmlns:a16="http://schemas.microsoft.com/office/drawing/2014/main" id="{832EE639-E917-4F84-83BE-FBC7A2D02B64}"/>
+                </a:ext>
+              </a:extLst>
+            </p:cNvPr>
+            <p:cNvSpPr txBox="1"/>
+            <p:nvPr/>
+          </p:nvSpPr>
+          <p:spPr>
+            <a:xfrm>
+              <a:off x="9093643" y="3426744"/>
+              <a:ext cx="2565620" cy="1021556"/>
+            </a:xfrm>
+            <a:prstGeom prst="roundRect">
+              <a:avLst/>
+            </a:prstGeom>
+            <a:ln cap="rnd"/>
+          </p:spPr>
+          <p:style>
+            <a:lnRef idx="3">
+              <a:schemeClr val="lt1"/>
+            </a:lnRef>
+            <a:fillRef idx="1">
+              <a:schemeClr val="accent1"/>
+            </a:fillRef>
+            <a:effectRef idx="1">
+              <a:schemeClr val="accent1"/>
+            </a:effectRef>
+            <a:fontRef idx="minor">
+              <a:schemeClr val="lt1"/>
+            </a:fontRef>
+          </p:style>
+          <p:txBody>
+            <a:bodyPr wrap="square" rtlCol="0">
+              <a:spAutoFit/>
+            </a:bodyPr>
+            <a:lstStyle/>
+            <a:p>
+              <a:pPr algn="ctr"/>
+              <a:r>
+                <a:rPr lang="fr-CA" dirty="0"/>
+                <a:t>Modèle zéros-enflés</a:t>
+              </a:r>
+            </a:p>
+            <a:p>
+              <a:pPr algn="ctr"/>
+              <a:r>
+                <a:rPr lang="fr-CA" dirty="0"/>
+                <a:t>Modèle « </a:t>
+              </a:r>
+              <a:r>
+                <a:rPr lang="fr-CA" dirty="0" err="1"/>
+                <a:t>Hurdle</a:t>
+              </a:r>
+              <a:r>
+                <a:rPr lang="fr-CA" dirty="0"/>
+                <a:t> »</a:t>
+              </a:r>
+            </a:p>
+            <a:p>
+              <a:pPr algn="ctr"/>
+              <a:r>
+                <a:rPr lang="fr-CA" dirty="0"/>
+                <a:t>Modèle zéros-tronqués</a:t>
+              </a:r>
+            </a:p>
+          </p:txBody>
+        </p:sp>
+        <p:cxnSp>
+          <p:nvCxnSpPr>
+            <p:cNvPr id="36" name="Connecteur : en angle 35">
+              <a:extLst>
+                <a:ext uri="{FF2B5EF4-FFF2-40B4-BE49-F238E27FC236}">
+                  <a16:creationId xmlns:a16="http://schemas.microsoft.com/office/drawing/2014/main" id="{E7D28F39-DF2B-4CC3-99ED-D575252771F9}"/>
+                </a:ext>
+              </a:extLst>
+            </p:cNvPr>
+            <p:cNvCxnSpPr>
+              <a:cxnSpLocks/>
+              <a:stCxn id="33" idx="2"/>
+              <a:endCxn id="34" idx="0"/>
+            </p:cNvCxnSpPr>
+            <p:nvPr/>
+          </p:nvCxnSpPr>
+          <p:spPr>
+            <a:xfrm rot="5400000">
+              <a:off x="7049297" y="2238489"/>
+              <a:ext cx="617946" cy="1758565"/>
+            </a:xfrm>
+            <a:prstGeom prst="bentConnector3">
+              <a:avLst/>
+            </a:prstGeom>
+            <a:ln>
+              <a:tailEnd type="triangle"/>
+            </a:ln>
+          </p:spPr>
+          <p:style>
+            <a:lnRef idx="1">
+              <a:schemeClr val="accent1"/>
+            </a:lnRef>
+            <a:fillRef idx="0">
+              <a:schemeClr val="accent1"/>
+            </a:fillRef>
+            <a:effectRef idx="0">
+              <a:schemeClr val="accent1"/>
+            </a:effectRef>
+            <a:fontRef idx="minor">
+              <a:schemeClr val="tx1"/>
+            </a:fontRef>
+          </p:style>
+        </p:cxnSp>
+        <p:sp>
+          <p:nvSpPr>
+            <p:cNvPr id="37" name="ZoneTexte 36">
+              <a:extLst>
+                <a:ext uri="{FF2B5EF4-FFF2-40B4-BE49-F238E27FC236}">
+                  <a16:creationId xmlns:a16="http://schemas.microsoft.com/office/drawing/2014/main" id="{090827C5-63D4-4B2C-9BA2-3B98B8D35291}"/>
+                </a:ext>
+              </a:extLst>
+            </p:cNvPr>
+            <p:cNvSpPr txBox="1"/>
+            <p:nvPr/>
+          </p:nvSpPr>
+          <p:spPr>
+            <a:xfrm>
+              <a:off x="7182016" y="2797010"/>
+              <a:ext cx="748085" cy="369332"/>
+            </a:xfrm>
+            <a:prstGeom prst="rect">
+              <a:avLst/>
+            </a:prstGeom>
+            <a:noFill/>
+          </p:spPr>
+          <p:txBody>
+            <a:bodyPr wrap="square" rtlCol="0">
+              <a:spAutoFit/>
+            </a:bodyPr>
+            <a:lstStyle/>
+            <a:p>
+              <a:r>
+                <a:rPr lang="fr-CA" dirty="0"/>
+                <a:t>Non</a:t>
+              </a:r>
+            </a:p>
+          </p:txBody>
+        </p:sp>
+        <p:cxnSp>
+          <p:nvCxnSpPr>
+            <p:cNvPr id="38" name="Connecteur : en angle 37">
+              <a:extLst>
+                <a:ext uri="{FF2B5EF4-FFF2-40B4-BE49-F238E27FC236}">
+                  <a16:creationId xmlns:a16="http://schemas.microsoft.com/office/drawing/2014/main" id="{83A1F417-A82F-408D-9D3C-FE813657CD92}"/>
+                </a:ext>
+              </a:extLst>
+            </p:cNvPr>
+            <p:cNvCxnSpPr>
+              <a:stCxn id="33" idx="2"/>
+              <a:endCxn id="35" idx="0"/>
+            </p:cNvCxnSpPr>
+            <p:nvPr/>
+          </p:nvCxnSpPr>
+          <p:spPr>
+            <a:xfrm rot="16200000" flipH="1">
+              <a:off x="8998029" y="2048320"/>
+              <a:ext cx="617946" cy="2138901"/>
+            </a:xfrm>
+            <a:prstGeom prst="bentConnector3">
+              <a:avLst/>
+            </a:prstGeom>
+            <a:ln>
+              <a:tailEnd type="triangle"/>
+            </a:ln>
+          </p:spPr>
+          <p:style>
+            <a:lnRef idx="1">
+              <a:schemeClr val="accent1"/>
+            </a:lnRef>
+            <a:fillRef idx="0">
+              <a:schemeClr val="accent1"/>
+            </a:fillRef>
+            <a:effectRef idx="0">
+              <a:schemeClr val="accent1"/>
+            </a:effectRef>
+            <a:fontRef idx="minor">
+              <a:schemeClr val="tx1"/>
+            </a:fontRef>
+          </p:style>
+        </p:cxnSp>
+        <p:sp>
+          <p:nvSpPr>
+            <p:cNvPr id="39" name="ZoneTexte 38">
+              <a:extLst>
+                <a:ext uri="{FF2B5EF4-FFF2-40B4-BE49-F238E27FC236}">
+                  <a16:creationId xmlns:a16="http://schemas.microsoft.com/office/drawing/2014/main" id="{FB0B1EB0-5F27-4E53-8CE0-D9854A71CA2A}"/>
+                </a:ext>
+              </a:extLst>
+            </p:cNvPr>
+            <p:cNvSpPr txBox="1"/>
+            <p:nvPr/>
+          </p:nvSpPr>
+          <p:spPr>
+            <a:xfrm>
+              <a:off x="8717280" y="2808796"/>
+              <a:ext cx="535388" cy="369332"/>
+            </a:xfrm>
+            <a:prstGeom prst="rect">
+              <a:avLst/>
+            </a:prstGeom>
+            <a:noFill/>
+          </p:spPr>
+          <p:txBody>
+            <a:bodyPr wrap="square" rtlCol="0">
+              <a:spAutoFit/>
+            </a:bodyPr>
+            <a:lstStyle/>
+            <a:p>
+              <a:r>
+                <a:rPr lang="fr-CA" dirty="0"/>
+                <a:t>Oui</a:t>
+              </a:r>
+            </a:p>
+          </p:txBody>
+        </p:sp>
+        <p:sp>
+          <p:nvSpPr>
+            <p:cNvPr id="50" name="ZoneTexte 49">
+              <a:extLst>
+                <a:ext uri="{FF2B5EF4-FFF2-40B4-BE49-F238E27FC236}">
+                  <a16:creationId xmlns:a16="http://schemas.microsoft.com/office/drawing/2014/main" id="{4E080541-EF83-46FE-B142-9F57FDA85291}"/>
+                </a:ext>
+              </a:extLst>
+            </p:cNvPr>
+            <p:cNvSpPr txBox="1"/>
+            <p:nvPr/>
+          </p:nvSpPr>
+          <p:spPr>
+            <a:xfrm>
+              <a:off x="5017272" y="5066246"/>
+              <a:ext cx="1876507" cy="715089"/>
+            </a:xfrm>
+            <a:prstGeom prst="roundRect">
+              <a:avLst/>
+            </a:prstGeom>
+            <a:ln cap="rnd"/>
+          </p:spPr>
+          <p:style>
+            <a:lnRef idx="3">
+              <a:schemeClr val="lt1"/>
+            </a:lnRef>
+            <a:fillRef idx="1">
+              <a:schemeClr val="accent1"/>
+            </a:fillRef>
+            <a:effectRef idx="1">
+              <a:schemeClr val="accent1"/>
+            </a:effectRef>
+            <a:fontRef idx="minor">
+              <a:schemeClr val="lt1"/>
+            </a:fontRef>
+          </p:style>
+          <p:txBody>
+            <a:bodyPr wrap="square" rtlCol="0">
+              <a:spAutoFit/>
+            </a:bodyPr>
+            <a:lstStyle/>
+            <a:p>
+              <a:pPr algn="ctr"/>
+              <a:r>
+                <a:rPr lang="fr-CA" dirty="0"/>
+                <a:t>Adéquation (fit) du modèle? </a:t>
+              </a:r>
+            </a:p>
+          </p:txBody>
+        </p:sp>
+        <p:sp>
+          <p:nvSpPr>
+            <p:cNvPr id="51" name="ZoneTexte 50">
+              <a:extLst>
+                <a:ext uri="{FF2B5EF4-FFF2-40B4-BE49-F238E27FC236}">
+                  <a16:creationId xmlns:a16="http://schemas.microsoft.com/office/drawing/2014/main" id="{630F4BDD-6C9B-476F-A44E-D072BCC5FC24}"/>
+                </a:ext>
+              </a:extLst>
+            </p:cNvPr>
+            <p:cNvSpPr txBox="1"/>
+            <p:nvPr/>
+          </p:nvSpPr>
+          <p:spPr>
+            <a:xfrm>
+              <a:off x="5974077" y="6399262"/>
+              <a:ext cx="4291055" cy="1940957"/>
+            </a:xfrm>
+            <a:prstGeom prst="roundRect">
+              <a:avLst/>
+            </a:prstGeom>
+            <a:ln cap="rnd"/>
+          </p:spPr>
+          <p:style>
+            <a:lnRef idx="3">
+              <a:schemeClr val="lt1"/>
+            </a:lnRef>
+            <a:fillRef idx="1">
+              <a:schemeClr val="accent1"/>
+            </a:fillRef>
+            <a:effectRef idx="1">
+              <a:schemeClr val="accent1"/>
+            </a:effectRef>
+            <a:fontRef idx="minor">
+              <a:schemeClr val="lt1"/>
+            </a:fontRef>
+          </p:style>
+          <p:txBody>
+            <a:bodyPr wrap="square" rtlCol="0">
+              <a:spAutoFit/>
+            </a:bodyPr>
+            <a:lstStyle/>
+            <a:p>
+              <a:pPr algn="ctr"/>
+              <a:r>
+                <a:rPr lang="fr-CA" dirty="0"/>
+                <a:t>Erreurs-types « </a:t>
+              </a:r>
+              <a:r>
+                <a:rPr lang="fr-CA" dirty="0" err="1"/>
+                <a:t>scaled</a:t>
+              </a:r>
+              <a:r>
+                <a:rPr lang="fr-CA" dirty="0"/>
+                <a:t> »</a:t>
+              </a:r>
+            </a:p>
+            <a:p>
+              <a:pPr algn="ctr"/>
+              <a:r>
+                <a:rPr lang="fr-CA" dirty="0"/>
+                <a:t>Erreurs-types robustes</a:t>
+              </a:r>
+            </a:p>
+            <a:p>
+              <a:pPr algn="ctr"/>
+              <a:r>
+                <a:rPr lang="fr-CA" dirty="0"/>
+                <a:t>Erreurs-types « </a:t>
+              </a:r>
+              <a:r>
+                <a:rPr lang="fr-CA" dirty="0" err="1"/>
+                <a:t>bootstrap</a:t>
+              </a:r>
+              <a:r>
+                <a:rPr lang="fr-CA" dirty="0"/>
+                <a:t> »</a:t>
+              </a:r>
+            </a:p>
+            <a:p>
+              <a:pPr algn="ctr"/>
+              <a:r>
+                <a:rPr lang="fr-CA" dirty="0"/>
+                <a:t>Erreurs-types « </a:t>
+              </a:r>
+              <a:r>
+                <a:rPr lang="fr-CA" dirty="0" err="1"/>
+                <a:t>jacknife</a:t>
+              </a:r>
+              <a:r>
+                <a:rPr lang="fr-CA" dirty="0"/>
+                <a:t> »</a:t>
+              </a:r>
+            </a:p>
+            <a:p>
+              <a:pPr algn="ctr"/>
+              <a:r>
+                <a:rPr lang="fr-CA" dirty="0"/>
+                <a:t>GEE</a:t>
+              </a:r>
+            </a:p>
+            <a:p>
+              <a:pPr algn="ctr"/>
+              <a:r>
+                <a:rPr lang="fr-CA" dirty="0"/>
+                <a:t>Modèle mixte (données « </a:t>
+              </a:r>
+              <a:r>
+                <a:rPr lang="fr-CA" dirty="0" err="1"/>
+                <a:t>clustered</a:t>
+              </a:r>
+              <a:r>
+                <a:rPr lang="fr-CA" dirty="0"/>
+                <a:t> »)</a:t>
+              </a:r>
+            </a:p>
+          </p:txBody>
+        </p:sp>
+        <p:sp>
+          <p:nvSpPr>
+            <p:cNvPr id="56" name="ZoneTexte 55">
+              <a:extLst>
+                <a:ext uri="{FF2B5EF4-FFF2-40B4-BE49-F238E27FC236}">
+                  <a16:creationId xmlns:a16="http://schemas.microsoft.com/office/drawing/2014/main" id="{05C3CAA5-F58D-4A08-890E-828FEC5BF758}"/>
+                </a:ext>
+              </a:extLst>
+            </p:cNvPr>
+            <p:cNvSpPr txBox="1"/>
+            <p:nvPr/>
+          </p:nvSpPr>
+          <p:spPr>
+            <a:xfrm>
+              <a:off x="6460766" y="5784303"/>
+              <a:ext cx="748085" cy="369332"/>
+            </a:xfrm>
+            <a:prstGeom prst="rect">
+              <a:avLst/>
+            </a:prstGeom>
+            <a:noFill/>
+          </p:spPr>
+          <p:txBody>
+            <a:bodyPr wrap="square" rtlCol="0">
+              <a:spAutoFit/>
+            </a:bodyPr>
+            <a:lstStyle/>
+            <a:p>
+              <a:r>
+                <a:rPr lang="fr-CA" dirty="0"/>
+                <a:t>Non</a:t>
+              </a:r>
+            </a:p>
+          </p:txBody>
+        </p:sp>
+        <p:sp>
+          <p:nvSpPr>
+            <p:cNvPr id="57" name="ZoneTexte 56">
+              <a:extLst>
+                <a:ext uri="{FF2B5EF4-FFF2-40B4-BE49-F238E27FC236}">
+                  <a16:creationId xmlns:a16="http://schemas.microsoft.com/office/drawing/2014/main" id="{BBA1EFF8-3838-4317-9675-47B0021E3B6A}"/>
+                </a:ext>
+              </a:extLst>
+            </p:cNvPr>
+            <p:cNvSpPr txBox="1"/>
+            <p:nvPr/>
+          </p:nvSpPr>
+          <p:spPr>
+            <a:xfrm>
+              <a:off x="4886075" y="5784303"/>
+              <a:ext cx="535388" cy="369332"/>
+            </a:xfrm>
+            <a:prstGeom prst="rect">
+              <a:avLst/>
+            </a:prstGeom>
+            <a:noFill/>
+          </p:spPr>
+          <p:txBody>
+            <a:bodyPr wrap="square" rtlCol="0">
+              <a:spAutoFit/>
+            </a:bodyPr>
+            <a:lstStyle/>
+            <a:p>
+              <a:r>
+                <a:rPr lang="fr-CA" dirty="0"/>
+                <a:t>Oui</a:t>
+              </a:r>
+            </a:p>
+          </p:txBody>
+        </p:sp>
+        <p:sp>
+          <p:nvSpPr>
+            <p:cNvPr id="58" name="ZoneTexte 57">
+              <a:extLst>
+                <a:ext uri="{FF2B5EF4-FFF2-40B4-BE49-F238E27FC236}">
+                  <a16:creationId xmlns:a16="http://schemas.microsoft.com/office/drawing/2014/main" id="{83ED49D2-F44F-471E-9621-FC487ED9225E}"/>
+                </a:ext>
+              </a:extLst>
+            </p:cNvPr>
+            <p:cNvSpPr txBox="1"/>
+            <p:nvPr/>
+          </p:nvSpPr>
+          <p:spPr>
+            <a:xfrm>
+              <a:off x="2732597" y="6399262"/>
+              <a:ext cx="2480808" cy="408623"/>
+            </a:xfrm>
+            <a:prstGeom prst="roundRect">
+              <a:avLst/>
+            </a:prstGeom>
+            <a:ln cap="rnd"/>
+          </p:spPr>
+          <p:style>
+            <a:lnRef idx="3">
+              <a:schemeClr val="lt1"/>
+            </a:lnRef>
+            <a:fillRef idx="1">
+              <a:schemeClr val="accent1"/>
+            </a:fillRef>
+            <a:effectRef idx="1">
+              <a:schemeClr val="accent1"/>
+            </a:effectRef>
+            <a:fontRef idx="minor">
+              <a:schemeClr val="lt1"/>
+            </a:fontRef>
+          </p:style>
+          <p:txBody>
+            <a:bodyPr wrap="square" rtlCol="0">
+              <a:spAutoFit/>
+            </a:bodyPr>
+            <a:lstStyle/>
+            <a:p>
+              <a:pPr algn="ctr"/>
+              <a:r>
+                <a:rPr lang="fr-CA" dirty="0"/>
+                <a:t>Conserver l’approche</a:t>
+              </a:r>
+            </a:p>
+          </p:txBody>
+        </p:sp>
+        <p:cxnSp>
+          <p:nvCxnSpPr>
+            <p:cNvPr id="60" name="Connecteur : en angle 59">
+              <a:extLst>
+                <a:ext uri="{FF2B5EF4-FFF2-40B4-BE49-F238E27FC236}">
+                  <a16:creationId xmlns:a16="http://schemas.microsoft.com/office/drawing/2014/main" id="{8E9E775B-51BE-4E31-BBC4-BF7B6FBF1D12}"/>
+                </a:ext>
+              </a:extLst>
+            </p:cNvPr>
+            <p:cNvCxnSpPr>
+              <a:cxnSpLocks/>
+              <a:stCxn id="50" idx="2"/>
+              <a:endCxn id="58" idx="0"/>
+            </p:cNvCxnSpPr>
+            <p:nvPr/>
+          </p:nvCxnSpPr>
+          <p:spPr>
+            <a:xfrm rot="5400000">
+              <a:off x="4655301" y="5099036"/>
+              <a:ext cx="617927" cy="1982525"/>
+            </a:xfrm>
+            <a:prstGeom prst="bentConnector3">
+              <a:avLst/>
+            </a:prstGeom>
+            <a:ln>
+              <a:tailEnd type="triangle"/>
+            </a:ln>
+          </p:spPr>
+          <p:style>
+            <a:lnRef idx="1">
+              <a:schemeClr val="accent1"/>
+            </a:lnRef>
+            <a:fillRef idx="0">
+              <a:schemeClr val="accent1"/>
+            </a:fillRef>
+            <a:effectRef idx="0">
+              <a:schemeClr val="accent1"/>
+            </a:effectRef>
+            <a:fontRef idx="minor">
+              <a:schemeClr val="tx1"/>
+            </a:fontRef>
+          </p:style>
+        </p:cxnSp>
+        <p:cxnSp>
+          <p:nvCxnSpPr>
+            <p:cNvPr id="62" name="Connecteur : en angle 61">
+              <a:extLst>
+                <a:ext uri="{FF2B5EF4-FFF2-40B4-BE49-F238E27FC236}">
+                  <a16:creationId xmlns:a16="http://schemas.microsoft.com/office/drawing/2014/main" id="{84AB023A-3F52-4FBA-8C93-666C34AEE943}"/>
+                </a:ext>
+              </a:extLst>
+            </p:cNvPr>
+            <p:cNvCxnSpPr>
+              <a:stCxn id="50" idx="2"/>
+              <a:endCxn id="51" idx="0"/>
+            </p:cNvCxnSpPr>
+            <p:nvPr/>
+          </p:nvCxnSpPr>
+          <p:spPr>
+            <a:xfrm rot="16200000" flipH="1">
+              <a:off x="6728602" y="5008258"/>
+              <a:ext cx="617927" cy="2164079"/>
+            </a:xfrm>
+            <a:prstGeom prst="bentConnector3">
+              <a:avLst/>
+            </a:prstGeom>
+            <a:ln>
+              <a:tailEnd type="triangle"/>
+            </a:ln>
+          </p:spPr>
+          <p:style>
+            <a:lnRef idx="1">
+              <a:schemeClr val="accent1"/>
+            </a:lnRef>
+            <a:fillRef idx="0">
+              <a:schemeClr val="accent1"/>
+            </a:fillRef>
+            <a:effectRef idx="0">
+              <a:schemeClr val="accent1"/>
+            </a:effectRef>
+            <a:fontRef idx="minor">
+              <a:schemeClr val="tx1"/>
+            </a:fontRef>
+          </p:style>
+        </p:cxnSp>
+        <p:cxnSp>
+          <p:nvCxnSpPr>
+            <p:cNvPr id="65" name="Connecteur : en angle 64">
+              <a:extLst>
+                <a:ext uri="{FF2B5EF4-FFF2-40B4-BE49-F238E27FC236}">
+                  <a16:creationId xmlns:a16="http://schemas.microsoft.com/office/drawing/2014/main" id="{A3D2888F-A613-4C08-8F3F-E7502769AD5F}"/>
+                </a:ext>
+              </a:extLst>
+            </p:cNvPr>
+            <p:cNvCxnSpPr>
+              <a:stCxn id="18" idx="2"/>
+              <a:endCxn id="50" idx="0"/>
+            </p:cNvCxnSpPr>
+            <p:nvPr/>
+          </p:nvCxnSpPr>
+          <p:spPr>
+            <a:xfrm rot="16200000" flipH="1">
+              <a:off x="2949064" y="2059783"/>
+              <a:ext cx="1230879" cy="4782045"/>
+            </a:xfrm>
+            <a:prstGeom prst="bentConnector3">
+              <a:avLst>
+                <a:gd name="adj1" fmla="val 75839"/>
+              </a:avLst>
+            </a:prstGeom>
+            <a:ln>
+              <a:tailEnd type="triangle"/>
+            </a:ln>
+          </p:spPr>
+          <p:style>
+            <a:lnRef idx="1">
+              <a:schemeClr val="accent1"/>
+            </a:lnRef>
+            <a:fillRef idx="0">
+              <a:schemeClr val="accent1"/>
+            </a:fillRef>
+            <a:effectRef idx="0">
+              <a:schemeClr val="accent1"/>
+            </a:effectRef>
+            <a:fontRef idx="minor">
+              <a:schemeClr val="tx1"/>
+            </a:fontRef>
+          </p:style>
+        </p:cxnSp>
+        <p:cxnSp>
+          <p:nvCxnSpPr>
+            <p:cNvPr id="67" name="Connecteur : en angle 66">
+              <a:extLst>
+                <a:ext uri="{FF2B5EF4-FFF2-40B4-BE49-F238E27FC236}">
+                  <a16:creationId xmlns:a16="http://schemas.microsoft.com/office/drawing/2014/main" id="{829AB7A0-EF38-4A74-8621-D663A076725D}"/>
+                </a:ext>
+              </a:extLst>
+            </p:cNvPr>
+            <p:cNvCxnSpPr>
+              <a:stCxn id="21" idx="2"/>
+              <a:endCxn id="50" idx="0"/>
+            </p:cNvCxnSpPr>
+            <p:nvPr/>
+          </p:nvCxnSpPr>
+          <p:spPr>
+            <a:xfrm rot="16200000" flipH="1">
+              <a:off x="4578428" y="3689148"/>
+              <a:ext cx="617946" cy="2136250"/>
+            </a:xfrm>
+            <a:prstGeom prst="bentConnector3">
+              <a:avLst>
+                <a:gd name="adj1" fmla="val 52573"/>
+              </a:avLst>
+            </a:prstGeom>
+            <a:ln>
+              <a:tailEnd type="triangle"/>
+            </a:ln>
+          </p:spPr>
+          <p:style>
+            <a:lnRef idx="1">
+              <a:schemeClr val="accent1"/>
+            </a:lnRef>
+            <a:fillRef idx="0">
+              <a:schemeClr val="accent1"/>
+            </a:fillRef>
+            <a:effectRef idx="0">
+              <a:schemeClr val="accent1"/>
+            </a:effectRef>
+            <a:fontRef idx="minor">
+              <a:schemeClr val="tx1"/>
+            </a:fontRef>
+          </p:style>
+        </p:cxnSp>
+        <p:cxnSp>
+          <p:nvCxnSpPr>
+            <p:cNvPr id="69" name="Connecteur : en angle 68">
+              <a:extLst>
+                <a:ext uri="{FF2B5EF4-FFF2-40B4-BE49-F238E27FC236}">
+                  <a16:creationId xmlns:a16="http://schemas.microsoft.com/office/drawing/2014/main" id="{6DE27CA1-3383-44D5-891C-B7980BAB3A8C}"/>
+                </a:ext>
+              </a:extLst>
+            </p:cNvPr>
+            <p:cNvCxnSpPr>
+              <a:stCxn id="34" idx="2"/>
+              <a:endCxn id="50" idx="0"/>
+            </p:cNvCxnSpPr>
+            <p:nvPr/>
+          </p:nvCxnSpPr>
+          <p:spPr>
+            <a:xfrm rot="5400000">
+              <a:off x="5601818" y="4189076"/>
+              <a:ext cx="1230879" cy="523461"/>
+            </a:xfrm>
+            <a:prstGeom prst="bentConnector3">
+              <a:avLst/>
+            </a:prstGeom>
+            <a:ln>
+              <a:tailEnd type="triangle"/>
+            </a:ln>
+          </p:spPr>
+          <p:style>
+            <a:lnRef idx="1">
+              <a:schemeClr val="accent1"/>
+            </a:lnRef>
+            <a:fillRef idx="0">
+              <a:schemeClr val="accent1"/>
+            </a:fillRef>
+            <a:effectRef idx="0">
+              <a:schemeClr val="accent1"/>
+            </a:effectRef>
+            <a:fontRef idx="minor">
+              <a:schemeClr val="tx1"/>
+            </a:fontRef>
+          </p:style>
+        </p:cxnSp>
+        <p:cxnSp>
+          <p:nvCxnSpPr>
+            <p:cNvPr id="71" name="Connecteur : en angle 70">
+              <a:extLst>
+                <a:ext uri="{FF2B5EF4-FFF2-40B4-BE49-F238E27FC236}">
+                  <a16:creationId xmlns:a16="http://schemas.microsoft.com/office/drawing/2014/main" id="{F862D585-0BE9-44DB-B710-79C0319B1A03}"/>
+                </a:ext>
+              </a:extLst>
+            </p:cNvPr>
+            <p:cNvCxnSpPr>
+              <a:stCxn id="35" idx="2"/>
+              <a:endCxn id="50" idx="0"/>
+            </p:cNvCxnSpPr>
+            <p:nvPr/>
+          </p:nvCxnSpPr>
+          <p:spPr>
+            <a:xfrm rot="5400000">
+              <a:off x="7857017" y="2546810"/>
+              <a:ext cx="617946" cy="4420927"/>
+            </a:xfrm>
+            <a:prstGeom prst="bentConnector3">
+              <a:avLst>
+                <a:gd name="adj1" fmla="val 52573"/>
+              </a:avLst>
+            </a:prstGeom>
+            <a:ln>
+              <a:tailEnd type="triangle"/>
+            </a:ln>
+          </p:spPr>
+          <p:style>
+            <a:lnRef idx="1">
+              <a:schemeClr val="accent1"/>
+            </a:lnRef>
+            <a:fillRef idx="0">
+              <a:schemeClr val="accent1"/>
+            </a:fillRef>
+            <a:effectRef idx="0">
+              <a:schemeClr val="accent1"/>
+            </a:effectRef>
+            <a:fontRef idx="minor">
+              <a:schemeClr val="tx1"/>
+            </a:fontRef>
+          </p:style>
+        </p:cxnSp>
+      </p:grpSp>
+    </p:spTree>
+    <p:extLst>
+      <p:ext uri="{BB962C8B-B14F-4D97-AF65-F5344CB8AC3E}">
+        <p14:creationId xmlns:p14="http://schemas.microsoft.com/office/powerpoint/2010/main" val="3446356298"/>
+      </p:ext>
+    </p:extLst>
+  </p:cSld>
+  <p:clrMapOvr>
+    <a:masterClrMapping/>
+  </p:clrMapOvr>
+</p:sld>
+</file>
+
 <file path=ppt/theme/theme1.xml><?xml version="1.0" encoding="utf-8"?>
 <a:theme xmlns:a="http://schemas.openxmlformats.org/drawingml/2006/main" name="Thème Office">
   <a:themeElements>

</xml_diff>